<commit_message>
adding pwrpnt pic for cam
</commit_message>
<xml_diff>
--- a/INSIDER.pptx
+++ b/INSIDER.pptx
@@ -14,6 +14,7 @@
     <p:sldId id="262" r:id="rId8"/>
     <p:sldId id="263" r:id="rId9"/>
     <p:sldId id="264" r:id="rId10"/>
+    <p:sldId id="265" r:id="rId11"/>
   </p:sldIdLst>
   <p:sldSz cx="12192000" cy="6858000"/>
   <p:notesSz cx="6858000" cy="9144000"/>
@@ -5762,6 +5763,89 @@
 </p:sld>
 </file>
 
+<file path=ppt/slides/slide10.xml><?xml version="1.0" encoding="utf-8"?>
+<p:sld xmlns:a="http://schemas.openxmlformats.org/drawingml/2006/main" xmlns:r="http://schemas.openxmlformats.org/officeDocument/2006/relationships" xmlns:p="http://schemas.openxmlformats.org/presentationml/2006/main">
+  <p:cSld>
+    <p:bg>
+      <p:bgPr>
+        <a:blipFill rotWithShape="1">
+          <a:blip r:embed="rId2">
+            <a:duotone>
+              <a:schemeClr val="bg2">
+                <a:shade val="28000"/>
+                <a:satMod val="94000"/>
+                <a:lumMod val="20000"/>
+              </a:schemeClr>
+              <a:schemeClr val="bg2">
+                <a:tint val="94000"/>
+                <a:shade val="84000"/>
+                <a:satMod val="148000"/>
+                <a:lumMod val="114000"/>
+              </a:schemeClr>
+            </a:duotone>
+            <a:extLst/>
+          </a:blip>
+          <a:stretch/>
+        </a:blipFill>
+        <a:effectLst/>
+      </p:bgPr>
+    </p:bg>
+    <p:spTree>
+      <p:nvGrpSpPr>
+        <p:cNvPr id="1" name=""/>
+        <p:cNvGrpSpPr/>
+        <p:nvPr/>
+      </p:nvGrpSpPr>
+      <p:grpSpPr>
+        <a:xfrm>
+          <a:off x="0" y="0"/>
+          <a:ext cx="0" cy="0"/>
+          <a:chOff x="0" y="0"/>
+          <a:chExt cx="0" cy="0"/>
+        </a:xfrm>
+      </p:grpSpPr>
+      <p:pic>
+        <p:nvPicPr>
+          <p:cNvPr id="2" name="Picture 1">
+            <a:extLst>
+              <a:ext uri="{FF2B5EF4-FFF2-40B4-BE49-F238E27FC236}">
+                <a16:creationId xmlns:a16="http://schemas.microsoft.com/office/drawing/2014/main" id="{D0DFD8A9-FE21-4C48-A266-B88A82EB7A2D}"/>
+              </a:ext>
+            </a:extLst>
+          </p:cNvPr>
+          <p:cNvPicPr>
+            <a:picLocks noChangeAspect="1"/>
+          </p:cNvPicPr>
+          <p:nvPr/>
+        </p:nvPicPr>
+        <p:blipFill rotWithShape="1">
+          <a:blip r:embed="rId3"/>
+          <a:srcRect l="9722" r="7611"/>
+          <a:stretch/>
+        </p:blipFill>
+        <p:spPr>
+          <a:xfrm>
+            <a:off x="912065" y="513036"/>
+            <a:ext cx="10367869" cy="5831927"/>
+          </a:xfrm>
+          <a:prstGeom prst="rect">
+            <a:avLst/>
+          </a:prstGeom>
+        </p:spPr>
+      </p:pic>
+    </p:spTree>
+    <p:extLst>
+      <p:ext uri="{BB962C8B-B14F-4D97-AF65-F5344CB8AC3E}">
+        <p14:creationId xmlns:p14="http://schemas.microsoft.com/office/powerpoint/2010/main" val="2068070881"/>
+      </p:ext>
+    </p:extLst>
+  </p:cSld>
+  <p:clrMapOvr>
+    <a:masterClrMapping/>
+  </p:clrMapOvr>
+</p:sld>
+</file>
+
 <file path=ppt/slides/slide2.xml><?xml version="1.0" encoding="utf-8"?>
 <p:sld xmlns:a="http://schemas.openxmlformats.org/drawingml/2006/main" xmlns:r="http://schemas.openxmlformats.org/officeDocument/2006/relationships" xmlns:p="http://schemas.openxmlformats.org/presentationml/2006/main">
   <p:cSld>

</xml_diff>